<commit_message>
Modificaciones finales segunda entrega
</commit_message>
<xml_diff>
--- a/PROYECTO FINAL - PRESENTANCION GERENCIAL.pptx
+++ b/PROYECTO FINAL - PRESENTANCION GERENCIAL.pptx
@@ -5,7 +5,7 @@
     <p:sldMasterId id="2147483659" r:id="rId1"/>
   </p:sldMasterIdLst>
   <p:notesMasterIdLst>
-    <p:notesMasterId r:id="rId23"/>
+    <p:notesMasterId r:id="rId24"/>
   </p:notesMasterIdLst>
   <p:sldIdLst>
     <p:sldId id="256" r:id="rId2"/>
@@ -23,27 +23,28 @@
     <p:sldId id="268" r:id="rId14"/>
     <p:sldId id="269" r:id="rId15"/>
     <p:sldId id="270" r:id="rId16"/>
-    <p:sldId id="271" r:id="rId17"/>
-    <p:sldId id="272" r:id="rId18"/>
-    <p:sldId id="273" r:id="rId19"/>
-    <p:sldId id="274" r:id="rId20"/>
-    <p:sldId id="275" r:id="rId21"/>
-    <p:sldId id="277" r:id="rId22"/>
+    <p:sldId id="278" r:id="rId17"/>
+    <p:sldId id="279" r:id="rId18"/>
+    <p:sldId id="280" r:id="rId19"/>
+    <p:sldId id="273" r:id="rId20"/>
+    <p:sldId id="274" r:id="rId21"/>
+    <p:sldId id="275" r:id="rId22"/>
+    <p:sldId id="277" r:id="rId23"/>
   </p:sldIdLst>
   <p:sldSz cx="9144000" cy="5143500" type="screen16x9"/>
   <p:notesSz cx="6858000" cy="9144000"/>
   <p:embeddedFontLst>
     <p:embeddedFont>
       <p:font typeface="Amasis MT Pro Light" panose="02040304050005020304" pitchFamily="18" charset="0"/>
-      <p:regular r:id="rId24"/>
-      <p:italic r:id="rId25"/>
+      <p:regular r:id="rId25"/>
+      <p:italic r:id="rId26"/>
     </p:embeddedFont>
     <p:embeddedFont>
       <p:font typeface="Roboto" panose="02000000000000000000" pitchFamily="2" charset="0"/>
-      <p:regular r:id="rId26"/>
-      <p:bold r:id="rId27"/>
-      <p:italic r:id="rId28"/>
-      <p:boldItalic r:id="rId29"/>
+      <p:regular r:id="rId27"/>
+      <p:bold r:id="rId28"/>
+      <p:italic r:id="rId29"/>
+      <p:boldItalic r:id="rId30"/>
     </p:embeddedFont>
   </p:embeddedFontLst>
   <p:defaultTextStyle>
@@ -1666,7 +1667,7 @@
     </p:spTree>
     <p:extLst>
       <p:ext uri="{BB962C8B-B14F-4D97-AF65-F5344CB8AC3E}">
-        <p14:creationId xmlns:p14="http://schemas.microsoft.com/office/powerpoint/2010/main" val="2278810872"/>
+        <p14:creationId xmlns:p14="http://schemas.microsoft.com/office/powerpoint/2010/main" val="326862894"/>
       </p:ext>
     </p:extLst>
   </p:cSld>
@@ -1681,7 +1682,7 @@
   <p:cSld>
     <p:spTree>
       <p:nvGrpSpPr>
-        <p:cNvPr id="1" name="Shape 70"/>
+        <p:cNvPr id="1" name="Shape 61"/>
         <p:cNvGrpSpPr/>
         <p:nvPr/>
       </p:nvGrpSpPr>
@@ -1695,7 +1696,7 @@
       </p:grpSpPr>
       <p:sp>
         <p:nvSpPr>
-          <p:cNvPr id="71" name="Google Shape;71;gf12c283abd_0_19:notes"/>
+          <p:cNvPr id="62" name="Google Shape;62;gf12c283abd_0_7:notes"/>
           <p:cNvSpPr>
             <a:spLocks noGrp="1" noRot="1" noChangeAspect="1"/>
           </p:cNvSpPr>
@@ -1736,7 +1737,7 @@
       </p:sp>
       <p:sp>
         <p:nvSpPr>
-          <p:cNvPr id="72" name="Google Shape;72;gf12c283abd_0_19:notes"/>
+          <p:cNvPr id="63" name="Google Shape;63;gf12c283abd_0_7:notes"/>
           <p:cNvSpPr txBox="1">
             <a:spLocks noGrp="1"/>
           </p:cNvSpPr>
@@ -1773,6 +1774,11 @@
         </p:txBody>
       </p:sp>
     </p:spTree>
+    <p:extLst>
+      <p:ext uri="{BB962C8B-B14F-4D97-AF65-F5344CB8AC3E}">
+        <p14:creationId xmlns:p14="http://schemas.microsoft.com/office/powerpoint/2010/main" val="2278810872"/>
+      </p:ext>
+    </p:extLst>
   </p:cSld>
   <p:clrMapOvr>
     <a:masterClrMapping/>
@@ -1877,11 +1883,6 @@
         </p:txBody>
       </p:sp>
     </p:spTree>
-    <p:extLst>
-      <p:ext uri="{BB962C8B-B14F-4D97-AF65-F5344CB8AC3E}">
-        <p14:creationId xmlns:p14="http://schemas.microsoft.com/office/powerpoint/2010/main" val="3717630377"/>
-      </p:ext>
-    </p:extLst>
   </p:cSld>
   <p:clrMapOvr>
     <a:masterClrMapping/>
@@ -2092,6 +2093,115 @@
     </p:spTree>
     <p:extLst>
       <p:ext uri="{BB962C8B-B14F-4D97-AF65-F5344CB8AC3E}">
+        <p14:creationId xmlns:p14="http://schemas.microsoft.com/office/powerpoint/2010/main" val="3717630377"/>
+      </p:ext>
+    </p:extLst>
+  </p:cSld>
+  <p:clrMapOvr>
+    <a:masterClrMapping/>
+  </p:clrMapOvr>
+</p:notes>
+</file>
+
+<file path=ppt/notesSlides/notesSlide21.xml><?xml version="1.0" encoding="utf-8"?>
+<p:notes xmlns:a="http://schemas.openxmlformats.org/drawingml/2006/main" xmlns:r="http://schemas.openxmlformats.org/officeDocument/2006/relationships" xmlns:p="http://schemas.openxmlformats.org/presentationml/2006/main" showMasterSp="0" showMasterPhAnim="0">
+  <p:cSld>
+    <p:spTree>
+      <p:nvGrpSpPr>
+        <p:cNvPr id="1" name="Shape 70"/>
+        <p:cNvGrpSpPr/>
+        <p:nvPr/>
+      </p:nvGrpSpPr>
+      <p:grpSpPr>
+        <a:xfrm>
+          <a:off x="0" y="0"/>
+          <a:ext cx="0" cy="0"/>
+          <a:chOff x="0" y="0"/>
+          <a:chExt cx="0" cy="0"/>
+        </a:xfrm>
+      </p:grpSpPr>
+      <p:sp>
+        <p:nvSpPr>
+          <p:cNvPr id="71" name="Google Shape;71;gf12c283abd_0_19:notes"/>
+          <p:cNvSpPr>
+            <a:spLocks noGrp="1" noRot="1" noChangeAspect="1"/>
+          </p:cNvSpPr>
+          <p:nvPr>
+            <p:ph type="sldImg" idx="2"/>
+          </p:nvPr>
+        </p:nvSpPr>
+        <p:spPr>
+          <a:xfrm>
+            <a:off x="381000" y="685800"/>
+            <a:ext cx="6096000" cy="3429000"/>
+          </a:xfrm>
+          <a:custGeom>
+            <a:avLst/>
+            <a:gdLst/>
+            <a:ahLst/>
+            <a:cxnLst/>
+            <a:rect l="l" t="t" r="r" b="b"/>
+            <a:pathLst>
+              <a:path w="120000" h="120000" extrusionOk="0">
+                <a:moveTo>
+                  <a:pt x="0" y="0"/>
+                </a:moveTo>
+                <a:lnTo>
+                  <a:pt x="120000" y="0"/>
+                </a:lnTo>
+                <a:lnTo>
+                  <a:pt x="120000" y="120000"/>
+                </a:lnTo>
+                <a:lnTo>
+                  <a:pt x="0" y="120000"/>
+                </a:lnTo>
+                <a:close/>
+              </a:path>
+            </a:pathLst>
+          </a:custGeom>
+        </p:spPr>
+      </p:sp>
+      <p:sp>
+        <p:nvSpPr>
+          <p:cNvPr id="72" name="Google Shape;72;gf12c283abd_0_19:notes"/>
+          <p:cNvSpPr txBox="1">
+            <a:spLocks noGrp="1"/>
+          </p:cNvSpPr>
+          <p:nvPr>
+            <p:ph type="body" idx="1"/>
+          </p:nvPr>
+        </p:nvSpPr>
+        <p:spPr>
+          <a:xfrm>
+            <a:off x="685800" y="4343400"/>
+            <a:ext cx="5486400" cy="4114800"/>
+          </a:xfrm>
+          <a:prstGeom prst="rect">
+            <a:avLst/>
+          </a:prstGeom>
+        </p:spPr>
+        <p:txBody>
+          <a:bodyPr spcFirstLastPara="1" wrap="square" lIns="91425" tIns="91425" rIns="91425" bIns="91425" anchor="t" anchorCtr="0">
+            <a:noAutofit/>
+          </a:bodyPr>
+          <a:lstStyle/>
+          <a:p>
+            <a:pPr marL="0" lvl="0" indent="0" algn="l" rtl="0">
+              <a:spcBef>
+                <a:spcPts val="0"/>
+              </a:spcBef>
+              <a:spcAft>
+                <a:spcPts val="0"/>
+              </a:spcAft>
+              <a:buNone/>
+            </a:pPr>
+            <a:endParaRPr/>
+          </a:p>
+        </p:txBody>
+      </p:sp>
+    </p:spTree>
+    <p:extLst>
+      <p:ext uri="{BB962C8B-B14F-4D97-AF65-F5344CB8AC3E}">
         <p14:creationId xmlns:p14="http://schemas.microsoft.com/office/powerpoint/2010/main" val="2200591036"/>
       </p:ext>
     </p:extLst>
@@ -2102,7 +2212,7 @@
 </p:notes>
 </file>
 
-<file path=ppt/notesSlides/notesSlide21.xml><?xml version="1.0" encoding="utf-8"?>
+<file path=ppt/notesSlides/notesSlide22.xml><?xml version="1.0" encoding="utf-8"?>
 <p:notes xmlns:a="http://schemas.openxmlformats.org/drawingml/2006/main" xmlns:r="http://schemas.openxmlformats.org/officeDocument/2006/relationships" xmlns:p="http://schemas.openxmlformats.org/presentationml/2006/main" showMasterSp="0" showMasterPhAnim="0">
   <p:cSld>
     <p:spTree>
@@ -3314,7 +3424,7 @@
             </a:pPr>
             <a:fld id="{00000000-1234-1234-1234-123412341234}" type="slidenum">
               <a:rPr lang="es"/>
-              <a:t>‹#›</a:t>
+              <a:t>‹Nº›</a:t>
             </a:fld>
             <a:endParaRPr/>
           </a:p>
@@ -3418,7 +3528,7 @@
             </a:pPr>
             <a:fld id="{00000000-1234-1234-1234-123412341234}" type="slidenum">
               <a:rPr lang="es"/>
-              <a:t>‹#›</a:t>
+              <a:t>‹Nº›</a:t>
             </a:fld>
             <a:endParaRPr/>
           </a:p>
@@ -3780,7 +3890,7 @@
             </a:pPr>
             <a:fld id="{00000000-1234-1234-1234-123412341234}" type="slidenum">
               <a:rPr lang="es"/>
-              <a:t>‹#›</a:t>
+              <a:t>‹Nº›</a:t>
             </a:fld>
             <a:endParaRPr/>
           </a:p>
@@ -4271,7 +4381,7 @@
             </a:pPr>
             <a:fld id="{00000000-1234-1234-1234-123412341234}" type="slidenum">
               <a:rPr lang="es"/>
-              <a:t>‹#›</a:t>
+              <a:t>‹Nº›</a:t>
             </a:fld>
             <a:endParaRPr/>
           </a:p>
@@ -4504,7 +4614,7 @@
             </a:pPr>
             <a:fld id="{00000000-1234-1234-1234-123412341234}" type="slidenum">
               <a:rPr lang="es"/>
-              <a:t>‹#›</a:t>
+              <a:t>‹Nº›</a:t>
             </a:fld>
             <a:endParaRPr/>
           </a:p>
@@ -4866,7 +4976,7 @@
             </a:pPr>
             <a:fld id="{00000000-1234-1234-1234-123412341234}" type="slidenum">
               <a:rPr lang="es"/>
-              <a:t>‹#›</a:t>
+              <a:t>‹Nº›</a:t>
             </a:fld>
             <a:endParaRPr/>
           </a:p>
@@ -5099,7 +5209,7 @@
             </a:pPr>
             <a:fld id="{00000000-1234-1234-1234-123412341234}" type="slidenum">
               <a:rPr lang="es"/>
-              <a:t>‹#›</a:t>
+              <a:t>‹Nº›</a:t>
             </a:fld>
             <a:endParaRPr/>
           </a:p>
@@ -5657,7 +5767,7 @@
             </a:pPr>
             <a:fld id="{00000000-1234-1234-1234-123412341234}" type="slidenum">
               <a:rPr lang="es"/>
-              <a:t>‹#›</a:t>
+              <a:t>‹Nº›</a:t>
             </a:fld>
             <a:endParaRPr/>
           </a:p>
@@ -5805,7 +5915,7 @@
             </a:pPr>
             <a:fld id="{00000000-1234-1234-1234-123412341234}" type="slidenum">
               <a:rPr lang="es"/>
-              <a:t>‹#›</a:t>
+              <a:t>‹Nº›</a:t>
             </a:fld>
             <a:endParaRPr/>
           </a:p>
@@ -6169,7 +6279,7 @@
             </a:pPr>
             <a:fld id="{00000000-1234-1234-1234-123412341234}" type="slidenum">
               <a:rPr lang="es"/>
-              <a:t>‹#›</a:t>
+              <a:t>‹Nº›</a:t>
             </a:fld>
             <a:endParaRPr/>
           </a:p>
@@ -6740,7 +6850,7 @@
             </a:pPr>
             <a:fld id="{00000000-1234-1234-1234-123412341234}" type="slidenum">
               <a:rPr lang="es"/>
-              <a:t>‹#›</a:t>
+              <a:t>‹Nº›</a:t>
             </a:fld>
             <a:endParaRPr/>
           </a:p>
@@ -9330,7 +9440,7 @@
             </a:pPr>
             <a:r>
               <a:rPr lang="es" dirty="0"/>
-              <a:t>Analisis de clientes y su recurrencia de compra:</a:t>
+              <a:t>Análisis de clientes y su recurrencia de compra</a:t>
             </a:r>
             <a:endParaRPr dirty="0"/>
           </a:p>
@@ -9351,7 +9461,7 @@
         <p:spPr>
           <a:xfrm>
             <a:off x="390940" y="1714607"/>
-            <a:ext cx="7533860" cy="523220"/>
+            <a:ext cx="7959684" cy="738664"/>
           </a:xfrm>
           <a:prstGeom prst="rect">
             <a:avLst/>
@@ -9365,12 +9475,8 @@
           <a:lstStyle/>
           <a:p>
             <a:r>
-              <a:rPr lang="es-ES" dirty="0" err="1"/>
-              <a:t>Análsis</a:t>
-            </a:r>
-            <a:r>
               <a:rPr lang="es-ES" dirty="0"/>
-              <a:t> de grupos de clientes a través del algoritmo K-</a:t>
+              <a:t>Utilizando el algoritmo k-</a:t>
             </a:r>
             <a:r>
               <a:rPr lang="es-ES" dirty="0" err="1"/>
@@ -9378,7 +9484,222 @@
             </a:r>
             <a:r>
               <a:rPr lang="es-ES" dirty="0"/>
-              <a:t>. Se logró establecer mediante el </a:t>
+              <a:t> se segmentó a los clientes en grupos de acuerdo a dos variables:</a:t>
+            </a:r>
+          </a:p>
+          <a:p>
+            <a:r>
+              <a:rPr lang="es-ES" dirty="0"/>
+              <a:t>- cantidad de dinero que gastaron (suma del precio de los productos que adquirieron)</a:t>
+            </a:r>
+          </a:p>
+          <a:p>
+            <a:r>
+              <a:rPr lang="es-ES" dirty="0"/>
+              <a:t>- recurrencia de compra (cantidad de transacciones que realizaron)</a:t>
+            </a:r>
+          </a:p>
+        </p:txBody>
+      </p:sp>
+      <p:pic>
+        <p:nvPicPr>
+          <p:cNvPr id="5" name="Imagen 4">
+            <a:extLst>
+              <a:ext uri="{FF2B5EF4-FFF2-40B4-BE49-F238E27FC236}">
+                <a16:creationId xmlns:a16="http://schemas.microsoft.com/office/drawing/2014/main" id="{7B643563-C413-47D0-8E2C-89AD4FD37591}"/>
+              </a:ext>
+            </a:extLst>
+          </p:cNvPr>
+          <p:cNvPicPr>
+            <a:picLocks noChangeAspect="1"/>
+          </p:cNvPicPr>
+          <p:nvPr/>
+        </p:nvPicPr>
+        <p:blipFill>
+          <a:blip r:embed="rId4"/>
+          <a:stretch>
+            <a:fillRect/>
+          </a:stretch>
+        </p:blipFill>
+        <p:spPr>
+          <a:xfrm>
+            <a:off x="2371630" y="2755294"/>
+            <a:ext cx="3714941" cy="1784442"/>
+          </a:xfrm>
+          <a:prstGeom prst="rect">
+            <a:avLst/>
+          </a:prstGeom>
+        </p:spPr>
+      </p:pic>
+    </p:spTree>
+  </p:cSld>
+  <p:clrMapOvr>
+    <a:masterClrMapping/>
+  </p:clrMapOvr>
+</p:sld>
+</file>
+
+<file path=ppt/slides/slide17.xml><?xml version="1.0" encoding="utf-8"?>
+<p:sld xmlns:a="http://schemas.openxmlformats.org/drawingml/2006/main" xmlns:r="http://schemas.openxmlformats.org/officeDocument/2006/relationships" xmlns:p="http://schemas.openxmlformats.org/presentationml/2006/main">
+  <p:cSld>
+    <p:spTree>
+      <p:nvGrpSpPr>
+        <p:cNvPr id="1" name="Shape 64"/>
+        <p:cNvGrpSpPr/>
+        <p:nvPr/>
+      </p:nvGrpSpPr>
+      <p:grpSpPr>
+        <a:xfrm>
+          <a:off x="0" y="0"/>
+          <a:ext cx="0" cy="0"/>
+          <a:chOff x="0" y="0"/>
+          <a:chExt cx="0" cy="0"/>
+        </a:xfrm>
+      </p:grpSpPr>
+      <p:sp>
+        <p:nvSpPr>
+          <p:cNvPr id="65" name="Google Shape;65;p14"/>
+          <p:cNvSpPr txBox="1">
+            <a:spLocks noGrp="1"/>
+          </p:cNvSpPr>
+          <p:nvPr>
+            <p:ph type="ctrTitle"/>
+          </p:nvPr>
+        </p:nvSpPr>
+        <p:spPr>
+          <a:xfrm>
+            <a:off x="311700" y="190300"/>
+            <a:ext cx="8520600" cy="750000"/>
+          </a:xfrm>
+          <a:prstGeom prst="rect">
+            <a:avLst/>
+          </a:prstGeom>
+        </p:spPr>
+        <p:txBody>
+          <a:bodyPr spcFirstLastPara="1" wrap="square" lIns="91425" tIns="91425" rIns="91425" bIns="91425" anchor="b" anchorCtr="0">
+            <a:noAutofit/>
+          </a:bodyPr>
+          <a:lstStyle/>
+          <a:p>
+            <a:pPr marL="0" lvl="0" indent="0" algn="l" rtl="0">
+              <a:spcBef>
+                <a:spcPts val="0"/>
+              </a:spcBef>
+              <a:spcAft>
+                <a:spcPts val="0"/>
+              </a:spcAft>
+              <a:buSzPts val="990"/>
+              <a:buNone/>
+            </a:pPr>
+            <a:r>
+              <a:rPr lang="es" sz="4380" dirty="0"/>
+              <a:t>Análisis de datos ecommerce</a:t>
+            </a:r>
+            <a:endParaRPr sz="4380" dirty="0"/>
+          </a:p>
+        </p:txBody>
+      </p:sp>
+      <p:pic>
+        <p:nvPicPr>
+          <p:cNvPr id="66" name="Google Shape;66;p14"/>
+          <p:cNvPicPr preferRelativeResize="0"/>
+          <p:nvPr/>
+        </p:nvPicPr>
+        <p:blipFill>
+          <a:blip r:embed="rId3">
+            <a:alphaModFix/>
+          </a:blip>
+          <a:stretch>
+            <a:fillRect/>
+          </a:stretch>
+        </p:blipFill>
+        <p:spPr>
+          <a:xfrm>
+            <a:off x="8013400" y="0"/>
+            <a:ext cx="1130601" cy="1130601"/>
+          </a:xfrm>
+          <a:prstGeom prst="rect">
+            <a:avLst/>
+          </a:prstGeom>
+          <a:noFill/>
+          <a:ln>
+            <a:noFill/>
+          </a:ln>
+        </p:spPr>
+      </p:pic>
+      <p:sp>
+        <p:nvSpPr>
+          <p:cNvPr id="67" name="Google Shape;67;p14"/>
+          <p:cNvSpPr txBox="1">
+            <a:spLocks noGrp="1"/>
+          </p:cNvSpPr>
+          <p:nvPr>
+            <p:ph type="subTitle" idx="1"/>
+          </p:nvPr>
+        </p:nvSpPr>
+        <p:spPr>
+          <a:xfrm>
+            <a:off x="224625" y="940300"/>
+            <a:ext cx="8415600" cy="539700"/>
+          </a:xfrm>
+          <a:prstGeom prst="rect">
+            <a:avLst/>
+          </a:prstGeom>
+        </p:spPr>
+        <p:txBody>
+          <a:bodyPr spcFirstLastPara="1" wrap="square" lIns="91425" tIns="91425" rIns="91425" bIns="91425" anchor="t" anchorCtr="0">
+            <a:normAutofit fontScale="92500" lnSpcReduction="10000"/>
+          </a:bodyPr>
+          <a:lstStyle/>
+          <a:p>
+            <a:pPr marL="0" lvl="0" indent="0" algn="l" rtl="0">
+              <a:spcBef>
+                <a:spcPts val="0"/>
+              </a:spcBef>
+              <a:spcAft>
+                <a:spcPts val="0"/>
+              </a:spcAft>
+              <a:buNone/>
+            </a:pPr>
+            <a:r>
+              <a:rPr lang="es" dirty="0"/>
+              <a:t>Análisis de clientes y su recurrencia de compra</a:t>
+            </a:r>
+            <a:endParaRPr dirty="0"/>
+          </a:p>
+        </p:txBody>
+      </p:sp>
+      <p:sp>
+        <p:nvSpPr>
+          <p:cNvPr id="2" name="CuadroTexto 1">
+            <a:extLst>
+              <a:ext uri="{FF2B5EF4-FFF2-40B4-BE49-F238E27FC236}">
+                <a16:creationId xmlns:a16="http://schemas.microsoft.com/office/drawing/2014/main" id="{BDF0CFCC-CB93-4C0A-B188-8256459B8DDB}"/>
+              </a:ext>
+            </a:extLst>
+          </p:cNvPr>
+          <p:cNvSpPr txBox="1"/>
+          <p:nvPr/>
+        </p:nvSpPr>
+        <p:spPr>
+          <a:xfrm>
+            <a:off x="390940" y="1714607"/>
+            <a:ext cx="7533860" cy="307777"/>
+          </a:xfrm>
+          <a:prstGeom prst="rect">
+            <a:avLst/>
+          </a:prstGeom>
+          <a:noFill/>
+        </p:spPr>
+        <p:txBody>
+          <a:bodyPr wrap="square" rtlCol="0">
+            <a:spAutoFit/>
+          </a:bodyPr>
+          <a:lstStyle/>
+          <a:p>
+            <a:r>
+              <a:rPr lang="es-ES" dirty="0"/>
+              <a:t>Mediante el </a:t>
             </a:r>
             <a:r>
               <a:rPr lang="es-AR" b="0" i="0" dirty="0" err="1">
@@ -9421,8 +9742,40 @@
               <a:t> </a:t>
             </a:r>
             <a:r>
+              <a:rPr lang="es-ES" b="0" i="0" dirty="0">
+                <a:solidFill>
+                  <a:srgbClr val="000000"/>
+                </a:solidFill>
+                <a:effectLst/>
+                <a:latin typeface="Helvetica Neue"/>
+              </a:rPr>
+              <a:t>s</a:t>
+            </a:r>
+            <a:r>
               <a:rPr lang="es-ES" dirty="0"/>
-              <a:t>4 clúster (grupos)</a:t>
+              <a:t>e logró establecer </a:t>
+            </a:r>
+            <a:r>
+              <a:rPr lang="es-AR" b="0" i="0" dirty="0">
+                <a:solidFill>
+                  <a:srgbClr val="000000"/>
+                </a:solidFill>
+                <a:effectLst/>
+                <a:latin typeface="Helvetica Neue"/>
+              </a:rPr>
+              <a:t>que lo óptimo sería armar </a:t>
+            </a:r>
+            <a:r>
+              <a:rPr lang="es-ES" dirty="0"/>
+              <a:t>4 </a:t>
+            </a:r>
+            <a:r>
+              <a:rPr lang="es-ES" dirty="0" err="1"/>
+              <a:t>clústers</a:t>
+            </a:r>
+            <a:r>
+              <a:rPr lang="es-ES" dirty="0"/>
+              <a:t> (grupos)</a:t>
             </a:r>
             <a:endParaRPr lang="es-AR" dirty="0"/>
           </a:p>
@@ -9459,6 +9812,11 @@
         </p:spPr>
       </p:pic>
     </p:spTree>
+    <p:extLst>
+      <p:ext uri="{BB962C8B-B14F-4D97-AF65-F5344CB8AC3E}">
+        <p14:creationId xmlns:p14="http://schemas.microsoft.com/office/powerpoint/2010/main" val="1157573266"/>
+      </p:ext>
+    </p:extLst>
   </p:cSld>
   <p:clrMapOvr>
     <a:masterClrMapping/>
@@ -9466,7 +9824,7 @@
 </p:sld>
 </file>
 
-<file path=ppt/slides/slide17.xml><?xml version="1.0" encoding="utf-8"?>
+<file path=ppt/slides/slide18.xml><?xml version="1.0" encoding="utf-8"?>
 <p:sld xmlns:a="http://schemas.openxmlformats.org/drawingml/2006/main" xmlns:r="http://schemas.openxmlformats.org/officeDocument/2006/relationships" xmlns:p="http://schemas.openxmlformats.org/presentationml/2006/main">
   <p:cSld>
     <p:spTree>
@@ -9590,7 +9948,7 @@
             </a:pPr>
             <a:r>
               <a:rPr lang="es" dirty="0"/>
-              <a:t>Analisis de clientes y recurrencia de compra:</a:t>
+              <a:t>Analisis de clientes y recurrencia de compra</a:t>
             </a:r>
             <a:endParaRPr dirty="0"/>
           </a:p>
@@ -9626,6 +9984,12 @@
           <a:p>
             <a:pPr algn="l"/>
             <a:r>
+              <a:rPr lang="es-ES" dirty="0">
+                <a:latin typeface="Helvetica Neue"/>
+              </a:rPr>
+              <a:t>Los grupos quedaron conformados de la siguiente manera</a:t>
+            </a:r>
+            <a:r>
               <a:rPr lang="es-ES" b="0" i="0" dirty="0">
                 <a:solidFill>
                   <a:srgbClr val="000000"/>
@@ -9633,7 +9997,7 @@
                 <a:effectLst/>
                 <a:latin typeface="Helvetica Neue"/>
               </a:rPr>
-              <a:t>En conclusión:</a:t>
+              <a:t>:</a:t>
             </a:r>
           </a:p>
           <a:p>
@@ -9714,10 +10078,10 @@
       </p:sp>
       <p:pic>
         <p:nvPicPr>
-          <p:cNvPr id="5" name="Imagen 4">
+          <p:cNvPr id="4" name="Imagen 3">
             <a:extLst>
               <a:ext uri="{FF2B5EF4-FFF2-40B4-BE49-F238E27FC236}">
-                <a16:creationId xmlns:a16="http://schemas.microsoft.com/office/drawing/2014/main" id="{53536179-EEFC-4C2C-862D-6BE779F09283}"/>
+                <a16:creationId xmlns:a16="http://schemas.microsoft.com/office/drawing/2014/main" id="{67CD4314-7E13-44BE-A776-6B45C5896CF0}"/>
               </a:ext>
             </a:extLst>
           </p:cNvPr>
@@ -9734,18 +10098,137 @@
         </p:blipFill>
         <p:spPr>
           <a:xfrm>
-            <a:off x="2707999" y="3815677"/>
-            <a:ext cx="2495550" cy="1095375"/>
+            <a:off x="1553598" y="3761589"/>
+            <a:ext cx="1640078" cy="1190949"/>
           </a:xfrm>
           <a:prstGeom prst="rect">
             <a:avLst/>
           </a:prstGeom>
         </p:spPr>
       </p:pic>
+      <p:pic>
+        <p:nvPicPr>
+          <p:cNvPr id="7" name="Imagen 6">
+            <a:extLst>
+              <a:ext uri="{FF2B5EF4-FFF2-40B4-BE49-F238E27FC236}">
+                <a16:creationId xmlns:a16="http://schemas.microsoft.com/office/drawing/2014/main" id="{E0E7BEB2-2933-4F62-82CB-7E5C39B69C9F}"/>
+              </a:ext>
+            </a:extLst>
+          </p:cNvPr>
+          <p:cNvPicPr>
+            <a:picLocks noChangeAspect="1"/>
+          </p:cNvPicPr>
+          <p:nvPr/>
+        </p:nvPicPr>
+        <p:blipFill>
+          <a:blip r:embed="rId5"/>
+          <a:stretch>
+            <a:fillRect/>
+          </a:stretch>
+        </p:blipFill>
+        <p:spPr>
+          <a:xfrm>
+            <a:off x="5491394" y="3740950"/>
+            <a:ext cx="1469764" cy="1232226"/>
+          </a:xfrm>
+          <a:prstGeom prst="rect">
+            <a:avLst/>
+          </a:prstGeom>
+        </p:spPr>
+      </p:pic>
+      <p:sp>
+        <p:nvSpPr>
+          <p:cNvPr id="11" name="CuadroTexto 10">
+            <a:extLst>
+              <a:ext uri="{FF2B5EF4-FFF2-40B4-BE49-F238E27FC236}">
+                <a16:creationId xmlns:a16="http://schemas.microsoft.com/office/drawing/2014/main" id="{3560D9A5-E2B1-4FAF-8A36-21F2DD4CC46F}"/>
+              </a:ext>
+            </a:extLst>
+          </p:cNvPr>
+          <p:cNvSpPr txBox="1"/>
+          <p:nvPr/>
+        </p:nvSpPr>
+        <p:spPr>
+          <a:xfrm>
+            <a:off x="867818" y="4306505"/>
+            <a:ext cx="685780" cy="307777"/>
+          </a:xfrm>
+          <a:prstGeom prst="rect">
+            <a:avLst/>
+          </a:prstGeom>
+          <a:noFill/>
+        </p:spPr>
+        <p:txBody>
+          <a:bodyPr wrap="square" rtlCol="0">
+            <a:spAutoFit/>
+          </a:bodyPr>
+          <a:lstStyle/>
+          <a:p>
+            <a:r>
+              <a:rPr lang="es-ES" b="0" i="0" dirty="0">
+                <a:solidFill>
+                  <a:srgbClr val="000000"/>
+                </a:solidFill>
+                <a:effectLst/>
+                <a:latin typeface="Helvetica Neue"/>
+              </a:rPr>
+              <a:t>mean</a:t>
+            </a:r>
+          </a:p>
+        </p:txBody>
+      </p:sp>
+      <p:sp>
+        <p:nvSpPr>
+          <p:cNvPr id="12" name="CuadroTexto 11">
+            <a:extLst>
+              <a:ext uri="{FF2B5EF4-FFF2-40B4-BE49-F238E27FC236}">
+                <a16:creationId xmlns:a16="http://schemas.microsoft.com/office/drawing/2014/main" id="{BFCA2929-A200-439F-B1B9-27802D282D67}"/>
+              </a:ext>
+            </a:extLst>
+          </p:cNvPr>
+          <p:cNvSpPr txBox="1"/>
+          <p:nvPr/>
+        </p:nvSpPr>
+        <p:spPr>
+          <a:xfrm>
+            <a:off x="4805614" y="4306504"/>
+            <a:ext cx="685780" cy="307777"/>
+          </a:xfrm>
+          <a:prstGeom prst="rect">
+            <a:avLst/>
+          </a:prstGeom>
+          <a:noFill/>
+        </p:spPr>
+        <p:txBody>
+          <a:bodyPr wrap="square" rtlCol="0">
+            <a:spAutoFit/>
+          </a:bodyPr>
+          <a:lstStyle/>
+          <a:p>
+            <a:r>
+              <a:rPr lang="es-ES" b="0" i="0" dirty="0" err="1">
+                <a:solidFill>
+                  <a:srgbClr val="000000"/>
+                </a:solidFill>
+                <a:effectLst/>
+                <a:latin typeface="Helvetica Neue"/>
+              </a:rPr>
+              <a:t>count</a:t>
+            </a:r>
+            <a:endParaRPr lang="es-ES" b="0" i="0" dirty="0">
+              <a:solidFill>
+                <a:srgbClr val="000000"/>
+              </a:solidFill>
+              <a:effectLst/>
+              <a:latin typeface="Helvetica Neue"/>
+            </a:endParaRPr>
+          </a:p>
+        </p:txBody>
+      </p:sp>
     </p:spTree>
     <p:extLst>
       <p:ext uri="{BB962C8B-B14F-4D97-AF65-F5344CB8AC3E}">
-        <p14:creationId xmlns:p14="http://schemas.microsoft.com/office/powerpoint/2010/main" val="2089331641"/>
+        <p14:creationId xmlns:p14="http://schemas.microsoft.com/office/powerpoint/2010/main" val="3821993644"/>
       </p:ext>
     </p:extLst>
   </p:cSld>
@@ -9755,7 +10238,7 @@
 </p:sld>
 </file>
 
-<file path=ppt/slides/slide18.xml><?xml version="1.0" encoding="utf-8"?>
+<file path=ppt/slides/slide19.xml><?xml version="1.0" encoding="utf-8"?>
 <p:sld xmlns:a="http://schemas.openxmlformats.org/drawingml/2006/main" xmlns:r="http://schemas.openxmlformats.org/officeDocument/2006/relationships" xmlns:p="http://schemas.openxmlformats.org/presentationml/2006/main">
   <p:cSld>
     <p:spTree>
@@ -9929,7 +10412,7 @@
                 <a:effectLst/>
                 <a:latin typeface="Helvetica Neue"/>
               </a:rPr>
-              <a:t>Vamos a elegir un algoritmo de clasificación para predecir cuál es el mejor </a:t>
+              <a:t>Se probaron algunos algoritmos de clasificación para predecir cuál sería el mejor </a:t>
             </a:r>
             <a:r>
               <a:rPr lang="es-ES" b="0" i="0" dirty="0" err="1">
@@ -9989,7 +10472,7 @@
                 <a:effectLst/>
                 <a:latin typeface="Helvetica Neue"/>
               </a:rPr>
-              <a:t>) para publicar un artículo y aumentar las chances de que se venda en base a su precio, la tienda y la línea del producto, los algoritmos analizados son:</a:t>
+              <a:t>) para publicar un artículo y aumentar las chances de que se venda en base a la información de ventas pasadas, y a su precio, la tienda y la línea del producto. Los algoritmos seleccionados fueron:</a:t>
             </a:r>
           </a:p>
           <a:p>
@@ -10106,7 +10589,201 @@
 </p:sld>
 </file>
 
-<file path=ppt/slides/slide19.xml><?xml version="1.0" encoding="utf-8"?>
+<file path=ppt/slides/slide2.xml><?xml version="1.0" encoding="utf-8"?>
+<p:sld xmlns:a="http://schemas.openxmlformats.org/drawingml/2006/main" xmlns:r="http://schemas.openxmlformats.org/officeDocument/2006/relationships" xmlns:p="http://schemas.openxmlformats.org/presentationml/2006/main">
+  <p:cSld>
+    <p:spTree>
+      <p:nvGrpSpPr>
+        <p:cNvPr id="1" name="Shape 64"/>
+        <p:cNvGrpSpPr/>
+        <p:nvPr/>
+      </p:nvGrpSpPr>
+      <p:grpSpPr>
+        <a:xfrm>
+          <a:off x="0" y="0"/>
+          <a:ext cx="0" cy="0"/>
+          <a:chOff x="0" y="0"/>
+          <a:chExt cx="0" cy="0"/>
+        </a:xfrm>
+      </p:grpSpPr>
+      <p:sp>
+        <p:nvSpPr>
+          <p:cNvPr id="65" name="Google Shape;65;p14"/>
+          <p:cNvSpPr txBox="1">
+            <a:spLocks noGrp="1"/>
+          </p:cNvSpPr>
+          <p:nvPr>
+            <p:ph type="ctrTitle"/>
+          </p:nvPr>
+        </p:nvSpPr>
+        <p:spPr>
+          <a:xfrm>
+            <a:off x="311700" y="190300"/>
+            <a:ext cx="8520600" cy="750000"/>
+          </a:xfrm>
+          <a:prstGeom prst="rect">
+            <a:avLst/>
+          </a:prstGeom>
+        </p:spPr>
+        <p:txBody>
+          <a:bodyPr spcFirstLastPara="1" wrap="square" lIns="91425" tIns="91425" rIns="91425" bIns="91425" anchor="b" anchorCtr="0">
+            <a:noAutofit/>
+          </a:bodyPr>
+          <a:lstStyle/>
+          <a:p>
+            <a:pPr marL="0" lvl="0" indent="0" algn="l" rtl="0">
+              <a:spcBef>
+                <a:spcPts val="0"/>
+              </a:spcBef>
+              <a:spcAft>
+                <a:spcPts val="0"/>
+              </a:spcAft>
+              <a:buSzPts val="990"/>
+              <a:buNone/>
+            </a:pPr>
+            <a:r>
+              <a:rPr lang="es" sz="4380"/>
+              <a:t>Análisis de datos ecommerce</a:t>
+            </a:r>
+            <a:endParaRPr sz="4380"/>
+          </a:p>
+        </p:txBody>
+      </p:sp>
+      <p:pic>
+        <p:nvPicPr>
+          <p:cNvPr id="66" name="Google Shape;66;p14"/>
+          <p:cNvPicPr preferRelativeResize="0"/>
+          <p:nvPr/>
+        </p:nvPicPr>
+        <p:blipFill>
+          <a:blip r:embed="rId3">
+            <a:alphaModFix/>
+          </a:blip>
+          <a:stretch>
+            <a:fillRect/>
+          </a:stretch>
+        </p:blipFill>
+        <p:spPr>
+          <a:xfrm>
+            <a:off x="8013400" y="0"/>
+            <a:ext cx="1130601" cy="1130601"/>
+          </a:xfrm>
+          <a:prstGeom prst="rect">
+            <a:avLst/>
+          </a:prstGeom>
+          <a:noFill/>
+          <a:ln>
+            <a:noFill/>
+          </a:ln>
+        </p:spPr>
+      </p:pic>
+      <p:sp>
+        <p:nvSpPr>
+          <p:cNvPr id="67" name="Google Shape;67;p14"/>
+          <p:cNvSpPr txBox="1">
+            <a:spLocks noGrp="1"/>
+          </p:cNvSpPr>
+          <p:nvPr>
+            <p:ph type="subTitle" idx="1"/>
+          </p:nvPr>
+        </p:nvSpPr>
+        <p:spPr>
+          <a:xfrm>
+            <a:off x="224625" y="940300"/>
+            <a:ext cx="8415600" cy="539700"/>
+          </a:xfrm>
+          <a:prstGeom prst="rect">
+            <a:avLst/>
+          </a:prstGeom>
+        </p:spPr>
+        <p:txBody>
+          <a:bodyPr spcFirstLastPara="1" wrap="square" lIns="91425" tIns="91425" rIns="91425" bIns="91425" anchor="t" anchorCtr="0">
+            <a:normAutofit fontScale="92500" lnSpcReduction="10000"/>
+          </a:bodyPr>
+          <a:lstStyle/>
+          <a:p>
+            <a:pPr marL="0" lvl="0" indent="0" algn="l" rtl="0">
+              <a:spcBef>
+                <a:spcPts val="0"/>
+              </a:spcBef>
+              <a:spcAft>
+                <a:spcPts val="0"/>
+              </a:spcAft>
+              <a:buNone/>
+            </a:pPr>
+            <a:r>
+              <a:rPr lang="es"/>
+              <a:t>Distribución de ventas del Primer trimestre 2021:</a:t>
+            </a:r>
+            <a:endParaRPr/>
+          </a:p>
+        </p:txBody>
+      </p:sp>
+      <p:pic>
+        <p:nvPicPr>
+          <p:cNvPr id="68" name="Google Shape;68;p14"/>
+          <p:cNvPicPr preferRelativeResize="0"/>
+          <p:nvPr/>
+        </p:nvPicPr>
+        <p:blipFill>
+          <a:blip r:embed="rId4">
+            <a:alphaModFix/>
+          </a:blip>
+          <a:stretch>
+            <a:fillRect/>
+          </a:stretch>
+        </p:blipFill>
+        <p:spPr>
+          <a:xfrm>
+            <a:off x="529325" y="1435550"/>
+            <a:ext cx="3726960" cy="3105800"/>
+          </a:xfrm>
+          <a:prstGeom prst="rect">
+            <a:avLst/>
+          </a:prstGeom>
+          <a:noFill/>
+          <a:ln>
+            <a:noFill/>
+          </a:ln>
+        </p:spPr>
+      </p:pic>
+      <p:pic>
+        <p:nvPicPr>
+          <p:cNvPr id="69" name="Google Shape;69;p14"/>
+          <p:cNvPicPr preferRelativeResize="0"/>
+          <p:nvPr/>
+        </p:nvPicPr>
+        <p:blipFill>
+          <a:blip r:embed="rId5">
+            <a:alphaModFix/>
+          </a:blip>
+          <a:stretch>
+            <a:fillRect/>
+          </a:stretch>
+        </p:blipFill>
+        <p:spPr>
+          <a:xfrm>
+            <a:off x="4754001" y="1480000"/>
+            <a:ext cx="3259400" cy="2893975"/>
+          </a:xfrm>
+          <a:prstGeom prst="rect">
+            <a:avLst/>
+          </a:prstGeom>
+          <a:noFill/>
+          <a:ln>
+            <a:noFill/>
+          </a:ln>
+        </p:spPr>
+      </p:pic>
+    </p:spTree>
+  </p:cSld>
+  <p:clrMapOvr>
+    <a:masterClrMapping/>
+  </p:clrMapOvr>
+</p:sld>
+</file>
+
+<file path=ppt/slides/slide20.xml><?xml version="1.0" encoding="utf-8"?>
 <p:sld xmlns:a="http://schemas.openxmlformats.org/drawingml/2006/main" xmlns:r="http://schemas.openxmlformats.org/officeDocument/2006/relationships" xmlns:p="http://schemas.openxmlformats.org/presentationml/2006/main">
   <p:cSld>
     <p:spTree>
@@ -10558,7 +11235,7 @@
               <a:tabLst/>
             </a:pPr>
             <a:r>
-              <a:rPr kumimoji="0" lang="es-AR" altLang="es-AR" sz="1100" b="1" i="0" u="none" strike="noStrike" cap="none" normalizeH="0" baseline="0" dirty="0" err="1">
+              <a:rPr kumimoji="0" lang="es-AR" altLang="es-AR" sz="1100" i="0" u="none" strike="noStrike" cap="none" normalizeH="0" baseline="0" dirty="0" err="1">
                 <a:ln>
                   <a:noFill/>
                 </a:ln>
@@ -10572,7 +11249,7 @@
               <a:t>Accuracy</a:t>
             </a:r>
             <a:r>
-              <a:rPr kumimoji="0" lang="es-AR" altLang="es-AR" sz="1100" b="1" i="0" u="none" strike="noStrike" cap="none" normalizeH="0" baseline="0" dirty="0">
+              <a:rPr kumimoji="0" lang="es-AR" altLang="es-AR" sz="1100" i="0" u="none" strike="noStrike" cap="none" normalizeH="0" baseline="0" dirty="0">
                 <a:ln>
                   <a:noFill/>
                 </a:ln>
@@ -11084,201 +11761,7 @@
 </p:sld>
 </file>
 
-<file path=ppt/slides/slide2.xml><?xml version="1.0" encoding="utf-8"?>
-<p:sld xmlns:a="http://schemas.openxmlformats.org/drawingml/2006/main" xmlns:r="http://schemas.openxmlformats.org/officeDocument/2006/relationships" xmlns:p="http://schemas.openxmlformats.org/presentationml/2006/main">
-  <p:cSld>
-    <p:spTree>
-      <p:nvGrpSpPr>
-        <p:cNvPr id="1" name="Shape 64"/>
-        <p:cNvGrpSpPr/>
-        <p:nvPr/>
-      </p:nvGrpSpPr>
-      <p:grpSpPr>
-        <a:xfrm>
-          <a:off x="0" y="0"/>
-          <a:ext cx="0" cy="0"/>
-          <a:chOff x="0" y="0"/>
-          <a:chExt cx="0" cy="0"/>
-        </a:xfrm>
-      </p:grpSpPr>
-      <p:sp>
-        <p:nvSpPr>
-          <p:cNvPr id="65" name="Google Shape;65;p14"/>
-          <p:cNvSpPr txBox="1">
-            <a:spLocks noGrp="1"/>
-          </p:cNvSpPr>
-          <p:nvPr>
-            <p:ph type="ctrTitle"/>
-          </p:nvPr>
-        </p:nvSpPr>
-        <p:spPr>
-          <a:xfrm>
-            <a:off x="311700" y="190300"/>
-            <a:ext cx="8520600" cy="750000"/>
-          </a:xfrm>
-          <a:prstGeom prst="rect">
-            <a:avLst/>
-          </a:prstGeom>
-        </p:spPr>
-        <p:txBody>
-          <a:bodyPr spcFirstLastPara="1" wrap="square" lIns="91425" tIns="91425" rIns="91425" bIns="91425" anchor="b" anchorCtr="0">
-            <a:noAutofit/>
-          </a:bodyPr>
-          <a:lstStyle/>
-          <a:p>
-            <a:pPr marL="0" lvl="0" indent="0" algn="l" rtl="0">
-              <a:spcBef>
-                <a:spcPts val="0"/>
-              </a:spcBef>
-              <a:spcAft>
-                <a:spcPts val="0"/>
-              </a:spcAft>
-              <a:buSzPts val="990"/>
-              <a:buNone/>
-            </a:pPr>
-            <a:r>
-              <a:rPr lang="es" sz="4380"/>
-              <a:t>Análisis de datos ecommerce</a:t>
-            </a:r>
-            <a:endParaRPr sz="4380"/>
-          </a:p>
-        </p:txBody>
-      </p:sp>
-      <p:pic>
-        <p:nvPicPr>
-          <p:cNvPr id="66" name="Google Shape;66;p14"/>
-          <p:cNvPicPr preferRelativeResize="0"/>
-          <p:nvPr/>
-        </p:nvPicPr>
-        <p:blipFill>
-          <a:blip r:embed="rId3">
-            <a:alphaModFix/>
-          </a:blip>
-          <a:stretch>
-            <a:fillRect/>
-          </a:stretch>
-        </p:blipFill>
-        <p:spPr>
-          <a:xfrm>
-            <a:off x="8013400" y="0"/>
-            <a:ext cx="1130601" cy="1130601"/>
-          </a:xfrm>
-          <a:prstGeom prst="rect">
-            <a:avLst/>
-          </a:prstGeom>
-          <a:noFill/>
-          <a:ln>
-            <a:noFill/>
-          </a:ln>
-        </p:spPr>
-      </p:pic>
-      <p:sp>
-        <p:nvSpPr>
-          <p:cNvPr id="67" name="Google Shape;67;p14"/>
-          <p:cNvSpPr txBox="1">
-            <a:spLocks noGrp="1"/>
-          </p:cNvSpPr>
-          <p:nvPr>
-            <p:ph type="subTitle" idx="1"/>
-          </p:nvPr>
-        </p:nvSpPr>
-        <p:spPr>
-          <a:xfrm>
-            <a:off x="224625" y="940300"/>
-            <a:ext cx="8415600" cy="539700"/>
-          </a:xfrm>
-          <a:prstGeom prst="rect">
-            <a:avLst/>
-          </a:prstGeom>
-        </p:spPr>
-        <p:txBody>
-          <a:bodyPr spcFirstLastPara="1" wrap="square" lIns="91425" tIns="91425" rIns="91425" bIns="91425" anchor="t" anchorCtr="0">
-            <a:normAutofit fontScale="92500" lnSpcReduction="10000"/>
-          </a:bodyPr>
-          <a:lstStyle/>
-          <a:p>
-            <a:pPr marL="0" lvl="0" indent="0" algn="l" rtl="0">
-              <a:spcBef>
-                <a:spcPts val="0"/>
-              </a:spcBef>
-              <a:spcAft>
-                <a:spcPts val="0"/>
-              </a:spcAft>
-              <a:buNone/>
-            </a:pPr>
-            <a:r>
-              <a:rPr lang="es"/>
-              <a:t>Distribución de ventas del Primer trimestre 2021:</a:t>
-            </a:r>
-            <a:endParaRPr/>
-          </a:p>
-        </p:txBody>
-      </p:sp>
-      <p:pic>
-        <p:nvPicPr>
-          <p:cNvPr id="68" name="Google Shape;68;p14"/>
-          <p:cNvPicPr preferRelativeResize="0"/>
-          <p:nvPr/>
-        </p:nvPicPr>
-        <p:blipFill>
-          <a:blip r:embed="rId4">
-            <a:alphaModFix/>
-          </a:blip>
-          <a:stretch>
-            <a:fillRect/>
-          </a:stretch>
-        </p:blipFill>
-        <p:spPr>
-          <a:xfrm>
-            <a:off x="529325" y="1435550"/>
-            <a:ext cx="3726960" cy="3105800"/>
-          </a:xfrm>
-          <a:prstGeom prst="rect">
-            <a:avLst/>
-          </a:prstGeom>
-          <a:noFill/>
-          <a:ln>
-            <a:noFill/>
-          </a:ln>
-        </p:spPr>
-      </p:pic>
-      <p:pic>
-        <p:nvPicPr>
-          <p:cNvPr id="69" name="Google Shape;69;p14"/>
-          <p:cNvPicPr preferRelativeResize="0"/>
-          <p:nvPr/>
-        </p:nvPicPr>
-        <p:blipFill>
-          <a:blip r:embed="rId5">
-            <a:alphaModFix/>
-          </a:blip>
-          <a:stretch>
-            <a:fillRect/>
-          </a:stretch>
-        </p:blipFill>
-        <p:spPr>
-          <a:xfrm>
-            <a:off x="4754001" y="1480000"/>
-            <a:ext cx="3259400" cy="2893975"/>
-          </a:xfrm>
-          <a:prstGeom prst="rect">
-            <a:avLst/>
-          </a:prstGeom>
-          <a:noFill/>
-          <a:ln>
-            <a:noFill/>
-          </a:ln>
-        </p:spPr>
-      </p:pic>
-    </p:spTree>
-  </p:cSld>
-  <p:clrMapOvr>
-    <a:masterClrMapping/>
-  </p:clrMapOvr>
-</p:sld>
-</file>
-
-<file path=ppt/slides/slide20.xml><?xml version="1.0" encoding="utf-8"?>
+<file path=ppt/slides/slide21.xml><?xml version="1.0" encoding="utf-8"?>
 <p:sld xmlns:a="http://schemas.openxmlformats.org/drawingml/2006/main" xmlns:r="http://schemas.openxmlformats.org/officeDocument/2006/relationships" xmlns:p="http://schemas.openxmlformats.org/presentationml/2006/main">
   <p:cSld>
     <p:spTree>
@@ -11796,7 +12279,7 @@
 </p:sld>
 </file>
 
-<file path=ppt/slides/slide21.xml><?xml version="1.0" encoding="utf-8"?>
+<file path=ppt/slides/slide22.xml><?xml version="1.0" encoding="utf-8"?>
 <p:sld xmlns:a="http://schemas.openxmlformats.org/drawingml/2006/main" xmlns:r="http://schemas.openxmlformats.org/officeDocument/2006/relationships" xmlns:p="http://schemas.openxmlformats.org/presentationml/2006/main">
   <p:cSld>
     <p:spTree>

</xml_diff>